<commit_message>
fix: change font from Montserrat to Roboto because one doesn't export to PDF right
</commit_message>
<xml_diff>
--- a/presentation/Restobook.pptx
+++ b/presentation/Restobook.pptx
@@ -7528,53 +7528,39 @@
           <a:p>
             <a:pPr algn="r"/>
             <a:r>
-              <a:rPr lang="ru-RU" dirty="0">
-                <a:latin typeface="Montserrat" panose="00000500000000000000" pitchFamily="2" charset="-52"/>
-              </a:rPr>
+              <a:rPr lang="ru-RU" dirty="0"/>
               <a:t>Путин Павел</a:t>
             </a:r>
           </a:p>
           <a:p>
             <a:pPr algn="r"/>
             <a:r>
-              <a:rPr lang="ru-RU" dirty="0">
-                <a:latin typeface="Montserrat" panose="00000500000000000000" pitchFamily="2" charset="-52"/>
-              </a:rPr>
+              <a:rPr lang="ru-RU" dirty="0"/>
               <a:t>Ефремов Михаил</a:t>
             </a:r>
           </a:p>
           <a:p>
             <a:pPr algn="r"/>
             <a:r>
-              <a:rPr lang="ru-RU" dirty="0" err="1">
-                <a:latin typeface="Montserrat" panose="00000500000000000000" pitchFamily="2" charset="-52"/>
-              </a:rPr>
+              <a:rPr lang="ru-RU" dirty="0" err="1"/>
               <a:t>Насайр</a:t>
             </a:r>
             <a:r>
-              <a:rPr lang="ru-RU" dirty="0">
-                <a:latin typeface="Montserrat" panose="00000500000000000000" pitchFamily="2" charset="-52"/>
-              </a:rPr>
+              <a:rPr lang="ru-RU" dirty="0"/>
               <a:t> Марьям</a:t>
             </a:r>
           </a:p>
           <a:p>
             <a:pPr algn="r"/>
             <a:r>
-              <a:rPr lang="ru-RU" dirty="0">
-                <a:latin typeface="Montserrat" panose="00000500000000000000" pitchFamily="2" charset="-52"/>
-              </a:rPr>
+              <a:rPr lang="ru-RU" dirty="0"/>
               <a:t>Ноэль </a:t>
             </a:r>
             <a:r>
-              <a:rPr lang="ru-RU" dirty="0" err="1">
-                <a:latin typeface="Montserrat" panose="00000500000000000000" pitchFamily="2" charset="-52"/>
-              </a:rPr>
+              <a:rPr lang="ru-RU" dirty="0" err="1"/>
               <a:t>Жулмист</a:t>
             </a:r>
-            <a:endParaRPr lang="ru-RU" dirty="0">
-              <a:latin typeface="Montserrat" panose="00000500000000000000" pitchFamily="2" charset="-52"/>
-            </a:endParaRPr>
+            <a:endParaRPr lang="ru-RU" dirty="0"/>
           </a:p>
         </p:txBody>
       </p:sp>
@@ -7941,37 +7927,26 @@
                 <a:solidFill>
                   <a:schemeClr val="accent1"/>
                 </a:solidFill>
-                <a:latin typeface="Montserrat" panose="00000500000000000000" pitchFamily="2" charset="-52"/>
               </a:rPr>
               <a:t>Путин Павел Александрович </a:t>
             </a:r>
             <a:r>
-              <a:rPr lang="en-US" sz="2400" dirty="0">
-                <a:latin typeface="Montserrat" panose="00000500000000000000" pitchFamily="2" charset="-52"/>
-              </a:rPr>
+              <a:rPr lang="en-US" sz="2400" dirty="0"/>
               <a:t>- team lead, </a:t>
             </a:r>
             <a:r>
-              <a:rPr lang="ru-RU" sz="2400" dirty="0" err="1">
-                <a:latin typeface="Montserrat" panose="00000500000000000000" pitchFamily="2" charset="-52"/>
-              </a:rPr>
+              <a:rPr lang="ru-RU" sz="2400" dirty="0" err="1"/>
               <a:t>проджект</a:t>
             </a:r>
             <a:r>
-              <a:rPr lang="ru-RU" sz="2400" dirty="0">
-                <a:latin typeface="Montserrat" panose="00000500000000000000" pitchFamily="2" charset="-52"/>
-              </a:rPr>
+              <a:rPr lang="ru-RU" sz="2400" dirty="0"/>
               <a:t>-менеджер, архитектор, </a:t>
             </a:r>
             <a:r>
-              <a:rPr lang="en-US" sz="2400" dirty="0" err="1">
-                <a:latin typeface="Montserrat" panose="00000500000000000000" pitchFamily="2" charset="-52"/>
-              </a:rPr>
+              <a:rPr lang="en-US" sz="2400" dirty="0" err="1"/>
               <a:t>fullstack</a:t>
             </a:r>
-            <a:endParaRPr lang="en-US" sz="2400" dirty="0">
-              <a:latin typeface="Montserrat" panose="00000500000000000000" pitchFamily="2" charset="-52"/>
-            </a:endParaRPr>
+            <a:endParaRPr lang="en-US" sz="2400" dirty="0"/>
           </a:p>
           <a:p>
             <a:r>
@@ -7979,26 +7954,19 @@
                 <a:solidFill>
                   <a:schemeClr val="accent1"/>
                 </a:solidFill>
-                <a:latin typeface="Montserrat" panose="00000500000000000000" pitchFamily="2" charset="-52"/>
               </a:rPr>
               <a:t>Ефремов Михаил Витальевич</a:t>
             </a:r>
             <a:r>
-              <a:rPr lang="ru-RU" sz="2400" dirty="0">
-                <a:latin typeface="Montserrat" panose="00000500000000000000" pitchFamily="2" charset="-52"/>
-              </a:rPr>
+              <a:rPr lang="ru-RU" sz="2400" dirty="0"/>
               <a:t> </a:t>
             </a:r>
             <a:r>
-              <a:rPr lang="en-US" sz="2400" dirty="0">
-                <a:latin typeface="Montserrat" panose="00000500000000000000" pitchFamily="2" charset="-52"/>
-              </a:rPr>
+              <a:rPr lang="en-US" sz="2400" dirty="0"/>
               <a:t>- </a:t>
             </a:r>
             <a:r>
-              <a:rPr lang="ru-RU" sz="2400" dirty="0">
-                <a:latin typeface="Montserrat" panose="00000500000000000000" pitchFamily="2" charset="-52"/>
-              </a:rPr>
+              <a:rPr lang="ru-RU" sz="2400" dirty="0"/>
               <a:t>аналитик, технический писатель, специалист по продажам, тестировщик</a:t>
             </a:r>
           </a:p>
@@ -8008,7 +7976,6 @@
                 <a:solidFill>
                   <a:schemeClr val="accent1"/>
                 </a:solidFill>
-                <a:latin typeface="Montserrat" panose="00000500000000000000" pitchFamily="2" charset="-52"/>
               </a:rPr>
               <a:t>Насайр</a:t>
             </a:r>
@@ -8017,7 +7984,6 @@
                 <a:solidFill>
                   <a:schemeClr val="accent1"/>
                 </a:solidFill>
-                <a:latin typeface="Montserrat" panose="00000500000000000000" pitchFamily="2" charset="-52"/>
               </a:rPr>
               <a:t> Марьям </a:t>
             </a:r>
@@ -8026,7 +7992,6 @@
                 <a:solidFill>
                   <a:schemeClr val="accent1"/>
                 </a:solidFill>
-                <a:latin typeface="Montserrat" panose="00000500000000000000" pitchFamily="2" charset="-52"/>
               </a:rPr>
               <a:t>Магди</a:t>
             </a:r>
@@ -8035,25 +8000,18 @@
                 <a:solidFill>
                   <a:schemeClr val="accent1"/>
                 </a:solidFill>
-                <a:latin typeface="Montserrat" panose="00000500000000000000" pitchFamily="2" charset="-52"/>
               </a:rPr>
               <a:t> Захи </a:t>
             </a:r>
             <a:r>
-              <a:rPr lang="en-US" sz="2400" dirty="0">
-                <a:latin typeface="Montserrat" panose="00000500000000000000" pitchFamily="2" charset="-52"/>
-              </a:rPr>
+              <a:rPr lang="en-US" sz="2400" dirty="0"/>
               <a:t>– backend</a:t>
             </a:r>
             <a:r>
-              <a:rPr lang="ru-RU" sz="2400" dirty="0">
-                <a:latin typeface="Montserrat" panose="00000500000000000000" pitchFamily="2" charset="-52"/>
-              </a:rPr>
+              <a:rPr lang="ru-RU" sz="2400" dirty="0"/>
               <a:t> разработчик</a:t>
             </a:r>
-            <a:endParaRPr lang="en-US" sz="2400" dirty="0">
-              <a:latin typeface="Montserrat" panose="00000500000000000000" pitchFamily="2" charset="-52"/>
-            </a:endParaRPr>
+            <a:endParaRPr lang="en-US" sz="2400" dirty="0"/>
           </a:p>
           <a:p>
             <a:r>
@@ -8061,7 +8019,6 @@
                 <a:solidFill>
                   <a:schemeClr val="accent1"/>
                 </a:solidFill>
-                <a:latin typeface="Montserrat" panose="00000500000000000000" pitchFamily="2" charset="-52"/>
               </a:rPr>
               <a:t>Ноэль </a:t>
             </a:r>
@@ -8070,7 +8027,6 @@
                 <a:solidFill>
                   <a:schemeClr val="accent1"/>
                 </a:solidFill>
-                <a:latin typeface="Montserrat" panose="00000500000000000000" pitchFamily="2" charset="-52"/>
               </a:rPr>
               <a:t>Жулмист</a:t>
             </a:r>
@@ -8079,43 +8035,30 @@
                 <a:solidFill>
                   <a:schemeClr val="accent1"/>
                 </a:solidFill>
-                <a:latin typeface="Montserrat" panose="00000500000000000000" pitchFamily="2" charset="-52"/>
               </a:rPr>
               <a:t> Филс </a:t>
             </a:r>
             <a:r>
-              <a:rPr lang="en-US" sz="2400" dirty="0">
-                <a:latin typeface="Montserrat" panose="00000500000000000000" pitchFamily="2" charset="-52"/>
-              </a:rPr>
+              <a:rPr lang="en-US" sz="2400" dirty="0"/>
               <a:t>– </a:t>
             </a:r>
             <a:r>
-              <a:rPr lang="ru-RU" sz="2400" dirty="0">
-                <a:latin typeface="Montserrat" panose="00000500000000000000" pitchFamily="2" charset="-52"/>
-              </a:rPr>
+              <a:rPr lang="ru-RU" sz="2400" dirty="0"/>
               <a:t>дизайнер, </a:t>
             </a:r>
             <a:r>
-              <a:rPr lang="en-US" sz="2400" dirty="0">
-                <a:latin typeface="Montserrat" panose="00000500000000000000" pitchFamily="2" charset="-52"/>
-              </a:rPr>
+              <a:rPr lang="en-US" sz="2400" dirty="0"/>
               <a:t>backend</a:t>
             </a:r>
             <a:r>
-              <a:rPr lang="ru-RU" sz="2400" dirty="0">
-                <a:latin typeface="Montserrat" panose="00000500000000000000" pitchFamily="2" charset="-52"/>
-              </a:rPr>
+              <a:rPr lang="ru-RU" sz="2400" dirty="0"/>
               <a:t> разработчик</a:t>
             </a:r>
             <a:r>
-              <a:rPr lang="en-US" sz="2400" dirty="0">
-                <a:latin typeface="Montserrat" panose="00000500000000000000" pitchFamily="2" charset="-52"/>
-              </a:rPr>
+              <a:rPr lang="en-US" sz="2400" dirty="0"/>
               <a:t> </a:t>
             </a:r>
-            <a:endParaRPr lang="ru-RU" sz="2400" dirty="0">
-              <a:latin typeface="Montserrat" panose="00000500000000000000" pitchFamily="2" charset="-52"/>
-            </a:endParaRPr>
+            <a:endParaRPr lang="ru-RU" sz="2400" dirty="0"/>
           </a:p>
         </p:txBody>
       </p:sp>
@@ -9413,14 +9356,14 @@
         <a:srgbClr val="A46694"/>
       </a:folHlink>
     </a:clrScheme>
-    <a:fontScheme name="Другая 1">
+    <a:fontScheme name="Другая 2">
       <a:majorFont>
         <a:latin typeface="Impact"/>
         <a:ea typeface=""/>
         <a:cs typeface=""/>
       </a:majorFont>
       <a:minorFont>
-        <a:latin typeface="Montserrat"/>
+        <a:latin typeface="Roboto"/>
         <a:ea typeface=""/>
         <a:cs typeface=""/>
       </a:minorFont>

</xml_diff>

<commit_message>
doc: add logo in presentation
</commit_message>
<xml_diff>
--- a/presentation/Restobook.pptx
+++ b/presentation/Restobook.pptx
@@ -218,7 +218,7 @@
           <a:p>
             <a:fld id="{90ABE644-5DA6-4F42-9056-5E70F70D6CF2}" type="datetimeFigureOut">
               <a:rPr lang="ru-RU" smtClean="0"/>
-              <a:t>11.03.2024</a:t>
+              <a:t>12.03.2024</a:t>
             </a:fld>
             <a:endParaRPr lang="ru-RU"/>
           </a:p>
@@ -1705,7 +1705,7 @@
           <a:p>
             <a:fld id="{B2D52420-6A92-4DC2-8591-889C8603F9D7}" type="datetime1">
               <a:rPr lang="ru-RU" smtClean="0"/>
-              <a:t>11.03.2024</a:t>
+              <a:t>12.03.2024</a:t>
             </a:fld>
             <a:endParaRPr lang="ru-RU"/>
           </a:p>
@@ -1970,7 +1970,7 @@
           <a:p>
             <a:fld id="{AFC6059B-B3EB-47F3-8BC6-5CF7158CCF5E}" type="datetime1">
               <a:rPr lang="ru-RU" smtClean="0"/>
-              <a:t>11.03.2024</a:t>
+              <a:t>12.03.2024</a:t>
             </a:fld>
             <a:endParaRPr lang="ru-RU"/>
           </a:p>
@@ -2172,7 +2172,7 @@
           <a:p>
             <a:fld id="{672DA8F7-9E1C-4330-89D8-5ACAE3F4BA4B}" type="datetime1">
               <a:rPr lang="ru-RU" smtClean="0"/>
-              <a:t>11.03.2024</a:t>
+              <a:t>12.03.2024</a:t>
             </a:fld>
             <a:endParaRPr lang="ru-RU"/>
           </a:p>
@@ -2374,7 +2374,7 @@
           <a:p>
             <a:fld id="{F4997B83-498B-4930-8185-A988F003D33A}" type="datetime1">
               <a:rPr lang="ru-RU" smtClean="0"/>
-              <a:t>11.03.2024</a:t>
+              <a:t>12.03.2024</a:t>
             </a:fld>
             <a:endParaRPr lang="ru-RU"/>
           </a:p>
@@ -2667,7 +2667,7 @@
           <a:p>
             <a:fld id="{3ABD95BC-C76F-444E-B3FB-BD27E4F798B7}" type="datetime1">
               <a:rPr lang="ru-RU" smtClean="0"/>
-              <a:t>11.03.2024</a:t>
+              <a:t>12.03.2024</a:t>
             </a:fld>
             <a:endParaRPr lang="ru-RU"/>
           </a:p>
@@ -3900,7 +3900,7 @@
           <a:p>
             <a:fld id="{E13DA6AE-AB60-4652-AB2E-D952392D1655}" type="datetime1">
               <a:rPr lang="ru-RU" smtClean="0"/>
-              <a:t>11.03.2024</a:t>
+              <a:t>12.03.2024</a:t>
             </a:fld>
             <a:endParaRPr lang="ru-RU"/>
           </a:p>
@@ -4321,7 +4321,7 @@
           <a:p>
             <a:fld id="{5E0F9A4F-E2CF-4D07-BEAB-A6631996DDD1}" type="datetime1">
               <a:rPr lang="ru-RU" smtClean="0"/>
-              <a:t>11.03.2024</a:t>
+              <a:t>12.03.2024</a:t>
             </a:fld>
             <a:endParaRPr lang="ru-RU"/>
           </a:p>
@@ -4468,7 +4468,7 @@
           <a:p>
             <a:fld id="{06D2A858-6E04-484B-9C45-539F27E3937C}" type="datetime1">
               <a:rPr lang="ru-RU" smtClean="0"/>
-              <a:t>11.03.2024</a:t>
+              <a:t>12.03.2024</a:t>
             </a:fld>
             <a:endParaRPr lang="ru-RU"/>
           </a:p>
@@ -4579,7 +4579,7 @@
           <a:p>
             <a:fld id="{AC6B3F91-F2E8-4402-9B00-8213E0D61D50}" type="datetime1">
               <a:rPr lang="ru-RU" smtClean="0"/>
-              <a:t>11.03.2024</a:t>
+              <a:t>12.03.2024</a:t>
             </a:fld>
             <a:endParaRPr lang="ru-RU"/>
           </a:p>
@@ -5362,7 +5362,7 @@
           <a:p>
             <a:fld id="{50FCF844-36E3-4D2D-9EE0-8615F370CF07}" type="datetime1">
               <a:rPr lang="ru-RU" smtClean="0"/>
-              <a:t>11.03.2024</a:t>
+              <a:t>12.03.2024</a:t>
             </a:fld>
             <a:endParaRPr lang="ru-RU"/>
           </a:p>
@@ -6219,7 +6219,7 @@
           <a:p>
             <a:fld id="{8C256B46-112F-45DA-B602-9179791C6F92}" type="datetime1">
               <a:rPr lang="ru-RU" smtClean="0"/>
-              <a:t>11.03.2024</a:t>
+              <a:t>12.03.2024</a:t>
             </a:fld>
             <a:endParaRPr lang="ru-RU"/>
           </a:p>
@@ -7010,7 +7010,7 @@
           <a:p>
             <a:fld id="{629052EF-D6AA-42E2-9131-813E79594612}" type="datetimeFigureOut">
               <a:rPr lang="ru-RU" smtClean="0"/>
-              <a:t>11.03.2024</a:t>
+              <a:t>12.03.2024</a:t>
             </a:fld>
             <a:endParaRPr lang="ru-RU"/>
           </a:p>
@@ -7445,7 +7445,10 @@
     <p:bg>
       <p:bgPr>
         <a:solidFill>
-          <a:schemeClr val="accent5"/>
+          <a:schemeClr val="accent1">
+            <a:lumMod val="60000"/>
+            <a:lumOff val="40000"/>
+          </a:schemeClr>
         </a:solidFill>
         <a:effectLst/>
       </p:bgPr>
@@ -7464,6 +7467,95 @@
           <a:chExt cx="0" cy="0"/>
         </a:xfrm>
       </p:grpSpPr>
+      <p:pic>
+        <p:nvPicPr>
+          <p:cNvPr id="10" name="Рисунок 9">
+            <a:extLst>
+              <a:ext uri="{FF2B5EF4-FFF2-40B4-BE49-F238E27FC236}">
+                <a16:creationId xmlns:a16="http://schemas.microsoft.com/office/drawing/2014/main" id="{537AF28C-05D5-E342-8651-4E34D736C92D}"/>
+              </a:ext>
+            </a:extLst>
+          </p:cNvPr>
+          <p:cNvPicPr>
+            <a:picLocks noChangeAspect="1"/>
+          </p:cNvPicPr>
+          <p:nvPr/>
+        </p:nvPicPr>
+        <p:blipFill rotWithShape="1">
+          <a:blip r:embed="rId2">
+            <a:extLst>
+              <a:ext uri="{28A0092B-C50C-407E-A947-70E740481C1C}">
+                <a14:useLocalDpi xmlns:a14="http://schemas.microsoft.com/office/drawing/2010/main" val="0"/>
+              </a:ext>
+            </a:extLst>
+          </a:blip>
+          <a:srcRect l="19772" t="19524" r="19504" b="13663"/>
+          <a:stretch/>
+        </p:blipFill>
+        <p:spPr>
+          <a:xfrm>
+            <a:off x="4711286" y="1905419"/>
+            <a:ext cx="2769429" cy="3047163"/>
+          </a:xfrm>
+          <a:prstGeom prst="rect">
+            <a:avLst/>
+          </a:prstGeom>
+        </p:spPr>
+      </p:pic>
+      <p:sp>
+        <p:nvSpPr>
+          <p:cNvPr id="11" name="Прямоугольник 10">
+            <a:extLst>
+              <a:ext uri="{FF2B5EF4-FFF2-40B4-BE49-F238E27FC236}">
+                <a16:creationId xmlns:a16="http://schemas.microsoft.com/office/drawing/2014/main" id="{9563B228-67A2-736C-5D9B-73C7AC51AB80}"/>
+              </a:ext>
+            </a:extLst>
+          </p:cNvPr>
+          <p:cNvSpPr/>
+          <p:nvPr/>
+        </p:nvSpPr>
+        <p:spPr>
+          <a:xfrm>
+            <a:off x="4662583" y="1865078"/>
+            <a:ext cx="3046920" cy="3191016"/>
+          </a:xfrm>
+          <a:prstGeom prst="rect">
+            <a:avLst/>
+          </a:prstGeom>
+          <a:solidFill>
+            <a:schemeClr val="bg2">
+              <a:alpha val="36000"/>
+            </a:schemeClr>
+          </a:solidFill>
+          <a:ln>
+            <a:noFill/>
+          </a:ln>
+        </p:spPr>
+        <p:style>
+          <a:lnRef idx="2">
+            <a:schemeClr val="accent1">
+              <a:shade val="15000"/>
+            </a:schemeClr>
+          </a:lnRef>
+          <a:fillRef idx="1">
+            <a:schemeClr val="accent1"/>
+          </a:fillRef>
+          <a:effectRef idx="0">
+            <a:schemeClr val="accent1"/>
+          </a:effectRef>
+          <a:fontRef idx="minor">
+            <a:schemeClr val="lt1"/>
+          </a:fontRef>
+        </p:style>
+        <p:txBody>
+          <a:bodyPr rtlCol="0" anchor="ctr"/>
+          <a:lstStyle/>
+          <a:p>
+            <a:pPr algn="ctr"/>
+            <a:endParaRPr lang="ru-RU"/>
+          </a:p>
+        </p:txBody>
+      </p:sp>
       <p:sp>
         <p:nvSpPr>
           <p:cNvPr id="2" name="Заголовок 1">
@@ -7480,7 +7572,12 @@
             <p:ph type="ctrTitle"/>
           </p:nvPr>
         </p:nvSpPr>
-        <p:spPr/>
+        <p:spPr>
+          <a:xfrm>
+            <a:off x="1078523" y="1098388"/>
+            <a:ext cx="10318418" cy="4394988"/>
+          </a:xfrm>
+        </p:spPr>
         <p:txBody>
           <a:bodyPr/>
           <a:lstStyle/>
@@ -7578,7 +7675,7 @@
         </p:nvSpPr>
         <p:spPr>
           <a:xfrm>
-            <a:off x="2436184" y="3671726"/>
+            <a:off x="2577916" y="3671726"/>
             <a:ext cx="7319632" cy="523220"/>
           </a:xfrm>
           <a:prstGeom prst="rect">

</xml_diff>

<commit_message>
feat: update feature slide
</commit_message>
<xml_diff>
--- a/presentation/Restobook.pptx
+++ b/presentation/Restobook.pptx
@@ -13,7 +13,7 @@
     <p:sldId id="257" r:id="rId4"/>
     <p:sldId id="262" r:id="rId5"/>
     <p:sldId id="270" r:id="rId6"/>
-    <p:sldId id="265" r:id="rId7"/>
+    <p:sldId id="276" r:id="rId7"/>
     <p:sldId id="273" r:id="rId8"/>
     <p:sldId id="274" r:id="rId9"/>
     <p:sldId id="267" r:id="rId10"/>
@@ -218,7 +218,7 @@
           <a:p>
             <a:fld id="{90ABE644-5DA6-4F42-9056-5E70F70D6CF2}" type="datetimeFigureOut">
               <a:rPr lang="ru-RU" smtClean="0"/>
-              <a:t>12.03.2024</a:t>
+              <a:t>13.03.2024</a:t>
             </a:fld>
             <a:endParaRPr lang="ru-RU"/>
           </a:p>
@@ -1705,7 +1705,7 @@
           <a:p>
             <a:fld id="{B2D52420-6A92-4DC2-8591-889C8603F9D7}" type="datetime1">
               <a:rPr lang="ru-RU" smtClean="0"/>
-              <a:t>12.03.2024</a:t>
+              <a:t>13.03.2024</a:t>
             </a:fld>
             <a:endParaRPr lang="ru-RU"/>
           </a:p>
@@ -1970,7 +1970,7 @@
           <a:p>
             <a:fld id="{AFC6059B-B3EB-47F3-8BC6-5CF7158CCF5E}" type="datetime1">
               <a:rPr lang="ru-RU" smtClean="0"/>
-              <a:t>12.03.2024</a:t>
+              <a:t>13.03.2024</a:t>
             </a:fld>
             <a:endParaRPr lang="ru-RU"/>
           </a:p>
@@ -2172,7 +2172,7 @@
           <a:p>
             <a:fld id="{672DA8F7-9E1C-4330-89D8-5ACAE3F4BA4B}" type="datetime1">
               <a:rPr lang="ru-RU" smtClean="0"/>
-              <a:t>12.03.2024</a:t>
+              <a:t>13.03.2024</a:t>
             </a:fld>
             <a:endParaRPr lang="ru-RU"/>
           </a:p>
@@ -2374,7 +2374,7 @@
           <a:p>
             <a:fld id="{F4997B83-498B-4930-8185-A988F003D33A}" type="datetime1">
               <a:rPr lang="ru-RU" smtClean="0"/>
-              <a:t>12.03.2024</a:t>
+              <a:t>13.03.2024</a:t>
             </a:fld>
             <a:endParaRPr lang="ru-RU"/>
           </a:p>
@@ -2667,7 +2667,7 @@
           <a:p>
             <a:fld id="{3ABD95BC-C76F-444E-B3FB-BD27E4F798B7}" type="datetime1">
               <a:rPr lang="ru-RU" smtClean="0"/>
-              <a:t>12.03.2024</a:t>
+              <a:t>13.03.2024</a:t>
             </a:fld>
             <a:endParaRPr lang="ru-RU"/>
           </a:p>
@@ -3900,7 +3900,7 @@
           <a:p>
             <a:fld id="{E13DA6AE-AB60-4652-AB2E-D952392D1655}" type="datetime1">
               <a:rPr lang="ru-RU" smtClean="0"/>
-              <a:t>12.03.2024</a:t>
+              <a:t>13.03.2024</a:t>
             </a:fld>
             <a:endParaRPr lang="ru-RU"/>
           </a:p>
@@ -4321,7 +4321,7 @@
           <a:p>
             <a:fld id="{5E0F9A4F-E2CF-4D07-BEAB-A6631996DDD1}" type="datetime1">
               <a:rPr lang="ru-RU" smtClean="0"/>
-              <a:t>12.03.2024</a:t>
+              <a:t>13.03.2024</a:t>
             </a:fld>
             <a:endParaRPr lang="ru-RU"/>
           </a:p>
@@ -4468,7 +4468,7 @@
           <a:p>
             <a:fld id="{06D2A858-6E04-484B-9C45-539F27E3937C}" type="datetime1">
               <a:rPr lang="ru-RU" smtClean="0"/>
-              <a:t>12.03.2024</a:t>
+              <a:t>13.03.2024</a:t>
             </a:fld>
             <a:endParaRPr lang="ru-RU"/>
           </a:p>
@@ -4579,7 +4579,7 @@
           <a:p>
             <a:fld id="{AC6B3F91-F2E8-4402-9B00-8213E0D61D50}" type="datetime1">
               <a:rPr lang="ru-RU" smtClean="0"/>
-              <a:t>12.03.2024</a:t>
+              <a:t>13.03.2024</a:t>
             </a:fld>
             <a:endParaRPr lang="ru-RU"/>
           </a:p>
@@ -5362,7 +5362,7 @@
           <a:p>
             <a:fld id="{50FCF844-36E3-4D2D-9EE0-8615F370CF07}" type="datetime1">
               <a:rPr lang="ru-RU" smtClean="0"/>
-              <a:t>12.03.2024</a:t>
+              <a:t>13.03.2024</a:t>
             </a:fld>
             <a:endParaRPr lang="ru-RU"/>
           </a:p>
@@ -6219,7 +6219,7 @@
           <a:p>
             <a:fld id="{8C256B46-112F-45DA-B602-9179791C6F92}" type="datetime1">
               <a:rPr lang="ru-RU" smtClean="0"/>
-              <a:t>12.03.2024</a:t>
+              <a:t>13.03.2024</a:t>
             </a:fld>
             <a:endParaRPr lang="ru-RU"/>
           </a:p>
@@ -7010,7 +7010,7 @@
           <a:p>
             <a:fld id="{629052EF-D6AA-42E2-9131-813E79594612}" type="datetimeFigureOut">
               <a:rPr lang="ru-RU" smtClean="0"/>
-              <a:t>12.03.2024</a:t>
+              <a:t>13.03.2024</a:t>
             </a:fld>
             <a:endParaRPr lang="ru-RU"/>
           </a:p>
@@ -7900,7 +7900,7 @@
             </a:r>
             <a:r>
               <a:rPr lang="en-US" sz="2400" dirty="0" err="1"/>
-              <a:t>iikoAPI</a:t>
+              <a:t>iiko</a:t>
             </a:r>
             <a:endParaRPr lang="en-US" sz="2400" dirty="0"/>
           </a:p>
@@ -8264,10 +8264,21 @@
         </p:nvSpPr>
         <p:spPr/>
         <p:txBody>
-          <a:bodyPr/>
+          <a:bodyPr>
+            <a:normAutofit/>
+          </a:bodyPr>
           <a:lstStyle/>
           <a:p>
-            <a:endParaRPr lang="ru-RU" dirty="0"/>
+            <a:r>
+              <a:rPr lang="ru-RU" sz="2500" dirty="0"/>
+              <a:t>Трудности при отслеживании броней и</a:t>
+            </a:r>
+          </a:p>
+          <a:p>
+            <a:r>
+              <a:rPr lang="ru-RU" sz="2500" dirty="0"/>
+              <a:t>Неудобство учёта забронированных столов</a:t>
+            </a:r>
           </a:p>
         </p:txBody>
       </p:sp>
@@ -8388,7 +8399,7 @@
             <a:pPr lvl="1"/>
             <a:r>
               <a:rPr lang="ru-RU" sz="2500" dirty="0"/>
-              <a:t>Владельцы заведений</a:t>
+              <a:t>Владельцы малых и средних заведений</a:t>
             </a:r>
           </a:p>
           <a:p>
@@ -8892,37 +8903,497 @@
           </a:p>
         </p:txBody>
       </p:sp>
-      <p:sp>
-        <p:nvSpPr>
-          <p:cNvPr id="3" name="Объект 2">
+      <p:graphicFrame>
+        <p:nvGraphicFramePr>
+          <p:cNvPr id="5" name="Объект 4">
             <a:extLst>
               <a:ext uri="{FF2B5EF4-FFF2-40B4-BE49-F238E27FC236}">
-                <a16:creationId xmlns:a16="http://schemas.microsoft.com/office/drawing/2014/main" id="{1A192799-65EF-E012-25E4-00268EEA5D83}"/>
+                <a16:creationId xmlns:a16="http://schemas.microsoft.com/office/drawing/2014/main" id="{1BC59ED2-76AF-B33E-ECC4-526A622608C8}"/>
               </a:ext>
             </a:extLst>
           </p:cNvPr>
-          <p:cNvSpPr>
-            <a:spLocks noGrp="1"/>
-          </p:cNvSpPr>
+          <p:cNvGraphicFramePr>
+            <a:graphicFrameLocks noGrp="1"/>
+          </p:cNvGraphicFramePr>
           <p:nvPr>
             <p:ph idx="1"/>
-          </p:nvPr>
-        </p:nvSpPr>
-        <p:spPr/>
-        <p:txBody>
-          <a:bodyPr/>
-          <a:lstStyle/>
-          <a:p>
-            <a:endParaRPr lang="ru-RU"/>
-          </a:p>
-          <a:p>
-            <a:r>
-              <a:rPr lang="ru-RU" dirty="0"/>
-              <a:t>Стоимость ежемесячной оплаты</a:t>
-            </a:r>
-          </a:p>
-        </p:txBody>
-      </p:sp>
+            <p:extLst>
+              <p:ext uri="{D42A27DB-BD31-4B8C-83A1-F6EECF244321}">
+                <p14:modId xmlns:p14="http://schemas.microsoft.com/office/powerpoint/2010/main" val="1473786911"/>
+              </p:ext>
+            </p:extLst>
+          </p:nvPr>
+        </p:nvGraphicFramePr>
+        <p:xfrm>
+          <a:off x="1250950" y="2286000"/>
+          <a:ext cx="10179048" cy="2715768"/>
+        </p:xfrm>
+        <a:graphic>
+          <a:graphicData uri="http://schemas.openxmlformats.org/drawingml/2006/table">
+            <a:tbl>
+              <a:tblPr firstRow="1" bandRow="1">
+                <a:tableStyleId>{5C22544A-7EE6-4342-B048-85BDC9FD1C3A}</a:tableStyleId>
+              </a:tblPr>
+              <a:tblGrid>
+                <a:gridCol w="1391666">
+                  <a:extLst>
+                    <a:ext uri="{9D8B030D-6E8A-4147-A177-3AD203B41FA5}">
+                      <a16:colId xmlns:a16="http://schemas.microsoft.com/office/drawing/2014/main" val="519921703"/>
+                    </a:ext>
+                  </a:extLst>
+                </a:gridCol>
+                <a:gridCol w="1755648">
+                  <a:extLst>
+                    <a:ext uri="{9D8B030D-6E8A-4147-A177-3AD203B41FA5}">
+                      <a16:colId xmlns:a16="http://schemas.microsoft.com/office/drawing/2014/main" val="4106884218"/>
+                    </a:ext>
+                  </a:extLst>
+                </a:gridCol>
+                <a:gridCol w="7031734">
+                  <a:extLst>
+                    <a:ext uri="{9D8B030D-6E8A-4147-A177-3AD203B41FA5}">
+                      <a16:colId xmlns:a16="http://schemas.microsoft.com/office/drawing/2014/main" val="810763547"/>
+                    </a:ext>
+                  </a:extLst>
+                </a:gridCol>
+              </a:tblGrid>
+              <a:tr h="649224">
+                <a:tc>
+                  <a:txBody>
+                    <a:bodyPr/>
+                    <a:lstStyle/>
+                    <a:p>
+                      <a:r>
+                        <a:rPr lang="ru-RU" sz="1800" b="0" kern="1200" dirty="0" err="1">
+                          <a:solidFill>
+                            <a:schemeClr val="bg1">
+                              <a:lumMod val="50000"/>
+                            </a:schemeClr>
+                          </a:solidFill>
+                          <a:effectLst/>
+                          <a:latin typeface="+mn-lt"/>
+                          <a:ea typeface="+mn-ea"/>
+                          <a:cs typeface="+mn-cs"/>
+                        </a:rPr>
+                        <a:t>Restoplace</a:t>
+                      </a:r>
+                      <a:endParaRPr lang="ru-RU" b="0" dirty="0">
+                        <a:solidFill>
+                          <a:schemeClr val="bg1">
+                            <a:lumMod val="50000"/>
+                          </a:schemeClr>
+                        </a:solidFill>
+                      </a:endParaRPr>
+                    </a:p>
+                  </a:txBody>
+                  <a:tcPr>
+                    <a:lnL w="12700" cap="flat" cmpd="sng" algn="ctr">
+                      <a:noFill/>
+                      <a:prstDash val="solid"/>
+                      <a:round/>
+                      <a:headEnd type="none" w="med" len="med"/>
+                      <a:tailEnd type="none" w="med" len="med"/>
+                    </a:lnL>
+                    <a:lnR w="12700" cap="flat" cmpd="sng" algn="ctr">
+                      <a:noFill/>
+                      <a:prstDash val="solid"/>
+                      <a:round/>
+                      <a:headEnd type="none" w="med" len="med"/>
+                      <a:tailEnd type="none" w="med" len="med"/>
+                    </a:lnR>
+                    <a:lnT w="12700" cap="flat" cmpd="sng" algn="ctr">
+                      <a:noFill/>
+                      <a:prstDash val="solid"/>
+                      <a:round/>
+                      <a:headEnd type="none" w="med" len="med"/>
+                      <a:tailEnd type="none" w="med" len="med"/>
+                    </a:lnT>
+                    <a:lnB w="12700" cap="flat" cmpd="sng" algn="ctr">
+                      <a:noFill/>
+                      <a:prstDash val="solid"/>
+                      <a:round/>
+                      <a:headEnd type="none" w="med" len="med"/>
+                      <a:tailEnd type="none" w="med" len="med"/>
+                    </a:lnB>
+                    <a:lnTlToBr w="12700" cmpd="sng">
+                      <a:noFill/>
+                      <a:prstDash val="solid"/>
+                    </a:lnTlToBr>
+                    <a:lnBlToTr w="12700" cmpd="sng">
+                      <a:noFill/>
+                      <a:prstDash val="solid"/>
+                    </a:lnBlToTr>
+                    <a:noFill/>
+                  </a:tcPr>
+                </a:tc>
+                <a:tc>
+                  <a:txBody>
+                    <a:bodyPr/>
+                    <a:lstStyle/>
+                    <a:p>
+                      <a:r>
+                        <a:rPr lang="en-US" sz="1800" b="0" kern="1200" dirty="0">
+                          <a:solidFill>
+                            <a:schemeClr val="bg1">
+                              <a:lumMod val="50000"/>
+                            </a:schemeClr>
+                          </a:solidFill>
+                          <a:effectLst/>
+                          <a:latin typeface="+mn-lt"/>
+                          <a:ea typeface="+mn-ea"/>
+                          <a:cs typeface="+mn-cs"/>
+                        </a:rPr>
+                        <a:t>1100</a:t>
+                      </a:r>
+                      <a:r>
+                        <a:rPr lang="ru-RU" sz="1800" b="0" kern="1200" dirty="0">
+                          <a:solidFill>
+                            <a:schemeClr val="bg1">
+                              <a:lumMod val="50000"/>
+                            </a:schemeClr>
+                          </a:solidFill>
+                          <a:effectLst/>
+                          <a:latin typeface="+mn-lt"/>
+                          <a:ea typeface="+mn-ea"/>
+                          <a:cs typeface="+mn-cs"/>
+                        </a:rPr>
+                        <a:t> ₽/</a:t>
+                      </a:r>
+                      <a:r>
+                        <a:rPr lang="ru-RU" sz="1800" b="0" kern="1200" dirty="0" err="1">
+                          <a:solidFill>
+                            <a:schemeClr val="bg1">
+                              <a:lumMod val="50000"/>
+                            </a:schemeClr>
+                          </a:solidFill>
+                          <a:effectLst/>
+                          <a:latin typeface="+mn-lt"/>
+                          <a:ea typeface="+mn-ea"/>
+                          <a:cs typeface="+mn-cs"/>
+                        </a:rPr>
+                        <a:t>мес</a:t>
+                      </a:r>
+                      <a:r>
+                        <a:rPr lang="en-US" sz="1800" b="0" kern="1200" dirty="0">
+                          <a:solidFill>
+                            <a:schemeClr val="bg1">
+                              <a:lumMod val="50000"/>
+                            </a:schemeClr>
+                          </a:solidFill>
+                          <a:effectLst/>
+                          <a:latin typeface="+mn-lt"/>
+                          <a:ea typeface="+mn-ea"/>
+                          <a:cs typeface="+mn-cs"/>
+                        </a:rPr>
+                        <a:t>.</a:t>
+                      </a:r>
+                      <a:endParaRPr lang="ru-RU" b="0" dirty="0">
+                        <a:solidFill>
+                          <a:schemeClr val="bg1">
+                            <a:lumMod val="50000"/>
+                          </a:schemeClr>
+                        </a:solidFill>
+                      </a:endParaRPr>
+                    </a:p>
+                  </a:txBody>
+                  <a:tcPr>
+                    <a:lnL w="12700" cap="flat" cmpd="sng" algn="ctr">
+                      <a:noFill/>
+                      <a:prstDash val="solid"/>
+                      <a:round/>
+                      <a:headEnd type="none" w="med" len="med"/>
+                      <a:tailEnd type="none" w="med" len="med"/>
+                    </a:lnL>
+                    <a:lnR w="12700" cap="flat" cmpd="sng" algn="ctr">
+                      <a:noFill/>
+                      <a:prstDash val="solid"/>
+                      <a:round/>
+                      <a:headEnd type="none" w="med" len="med"/>
+                      <a:tailEnd type="none" w="med" len="med"/>
+                    </a:lnR>
+                    <a:lnT w="12700" cap="flat" cmpd="sng" algn="ctr">
+                      <a:noFill/>
+                      <a:prstDash val="solid"/>
+                      <a:round/>
+                      <a:headEnd type="none" w="med" len="med"/>
+                      <a:tailEnd type="none" w="med" len="med"/>
+                    </a:lnT>
+                    <a:lnB w="12700" cap="flat" cmpd="sng" algn="ctr">
+                      <a:noFill/>
+                      <a:prstDash val="solid"/>
+                      <a:round/>
+                      <a:headEnd type="none" w="med" len="med"/>
+                      <a:tailEnd type="none" w="med" len="med"/>
+                    </a:lnB>
+                    <a:lnTlToBr w="12700" cmpd="sng">
+                      <a:noFill/>
+                      <a:prstDash val="solid"/>
+                    </a:lnTlToBr>
+                    <a:lnBlToTr w="12700" cmpd="sng">
+                      <a:noFill/>
+                      <a:prstDash val="solid"/>
+                    </a:lnBlToTr>
+                    <a:noFill/>
+                  </a:tcPr>
+                </a:tc>
+                <a:tc rowSpan="2">
+                  <a:txBody>
+                    <a:bodyPr/>
+                    <a:lstStyle/>
+                    <a:p>
+                      <a:pPr algn="ctr"/>
+                      <a:r>
+                        <a:rPr lang="en-US" sz="9600" dirty="0" err="1">
+                          <a:solidFill>
+                            <a:schemeClr val="tx1"/>
+                          </a:solidFill>
+                          <a:effectLst/>
+                          <a:latin typeface="Pacifico" panose="020F0502020204030204" pitchFamily="2" charset="-52"/>
+                        </a:rPr>
+                        <a:t>Restobook</a:t>
+                      </a:r>
+                      <a:endParaRPr lang="en-US" sz="9600" dirty="0">
+                        <a:solidFill>
+                          <a:schemeClr val="tx1"/>
+                        </a:solidFill>
+                        <a:effectLst/>
+                        <a:latin typeface="Pacifico" panose="020F0502020204030204" pitchFamily="2" charset="-52"/>
+                      </a:endParaRPr>
+                    </a:p>
+                    <a:p>
+                      <a:pPr algn="ctr"/>
+                      <a:r>
+                        <a:rPr lang="en-US" sz="4800" dirty="0">
+                          <a:solidFill>
+                            <a:schemeClr val="tx1"/>
+                          </a:solidFill>
+                          <a:effectLst/>
+                          <a:latin typeface="Pacifico" panose="020F0502020204030204" pitchFamily="2" charset="-52"/>
+                        </a:rPr>
+                        <a:t>750 </a:t>
+                      </a:r>
+                      <a:r>
+                        <a:rPr lang="ru-RU" sz="4800" kern="1200" dirty="0">
+                          <a:solidFill>
+                            <a:schemeClr val="tx1"/>
+                          </a:solidFill>
+                          <a:effectLst/>
+                          <a:latin typeface="+mn-lt"/>
+                          <a:ea typeface="+mn-ea"/>
+                          <a:cs typeface="+mn-cs"/>
+                        </a:rPr>
+                        <a:t>₽/месяц</a:t>
+                      </a:r>
+                      <a:endParaRPr lang="ru-RU" sz="4800" dirty="0">
+                        <a:solidFill>
+                          <a:schemeClr val="tx1"/>
+                        </a:solidFill>
+                      </a:endParaRPr>
+                    </a:p>
+                  </a:txBody>
+                  <a:tcPr>
+                    <a:lnL w="12700" cap="flat" cmpd="sng" algn="ctr">
+                      <a:noFill/>
+                      <a:prstDash val="solid"/>
+                      <a:round/>
+                      <a:headEnd type="none" w="med" len="med"/>
+                      <a:tailEnd type="none" w="med" len="med"/>
+                    </a:lnL>
+                    <a:lnR w="12700" cap="flat" cmpd="sng" algn="ctr">
+                      <a:noFill/>
+                      <a:prstDash val="solid"/>
+                      <a:round/>
+                      <a:headEnd type="none" w="med" len="med"/>
+                      <a:tailEnd type="none" w="med" len="med"/>
+                    </a:lnR>
+                    <a:lnT w="12700" cap="flat" cmpd="sng" algn="ctr">
+                      <a:noFill/>
+                      <a:prstDash val="solid"/>
+                      <a:round/>
+                      <a:headEnd type="none" w="med" len="med"/>
+                      <a:tailEnd type="none" w="med" len="med"/>
+                    </a:lnT>
+                    <a:lnB w="12700" cap="flat" cmpd="sng" algn="ctr">
+                      <a:noFill/>
+                      <a:prstDash val="solid"/>
+                      <a:round/>
+                      <a:headEnd type="none" w="med" len="med"/>
+                      <a:tailEnd type="none" w="med" len="med"/>
+                    </a:lnB>
+                    <a:lnTlToBr w="12700" cmpd="sng">
+                      <a:noFill/>
+                      <a:prstDash val="solid"/>
+                    </a:lnTlToBr>
+                    <a:lnBlToTr w="12700" cmpd="sng">
+                      <a:noFill/>
+                      <a:prstDash val="solid"/>
+                    </a:lnBlToTr>
+                    <a:noFill/>
+                  </a:tcPr>
+                </a:tc>
+                <a:extLst>
+                  <a:ext uri="{0D108BD9-81ED-4DB2-BD59-A6C34878D82A}">
+                    <a16:rowId xmlns:a16="http://schemas.microsoft.com/office/drawing/2014/main" val="3302245444"/>
+                  </a:ext>
+                </a:extLst>
+              </a:tr>
+              <a:tr h="2066544">
+                <a:tc>
+                  <a:txBody>
+                    <a:bodyPr/>
+                    <a:lstStyle/>
+                    <a:p>
+                      <a:r>
+                        <a:rPr lang="ru-RU" sz="1800" b="0" kern="1200" dirty="0" err="1">
+                          <a:solidFill>
+                            <a:schemeClr val="bg1">
+                              <a:lumMod val="50000"/>
+                            </a:schemeClr>
+                          </a:solidFill>
+                          <a:effectLst/>
+                          <a:latin typeface="+mn-lt"/>
+                          <a:ea typeface="+mn-ea"/>
+                          <a:cs typeface="+mn-cs"/>
+                        </a:rPr>
+                        <a:t>GuestMe</a:t>
+                      </a:r>
+                      <a:endParaRPr lang="ru-RU" b="0" dirty="0">
+                        <a:solidFill>
+                          <a:schemeClr val="bg1">
+                            <a:lumMod val="50000"/>
+                          </a:schemeClr>
+                        </a:solidFill>
+                      </a:endParaRPr>
+                    </a:p>
+                  </a:txBody>
+                  <a:tcPr>
+                    <a:lnL w="12700" cap="flat" cmpd="sng" algn="ctr">
+                      <a:noFill/>
+                      <a:prstDash val="solid"/>
+                      <a:round/>
+                      <a:headEnd type="none" w="med" len="med"/>
+                      <a:tailEnd type="none" w="med" len="med"/>
+                    </a:lnL>
+                    <a:lnR w="12700" cap="flat" cmpd="sng" algn="ctr">
+                      <a:noFill/>
+                      <a:prstDash val="solid"/>
+                      <a:round/>
+                      <a:headEnd type="none" w="med" len="med"/>
+                      <a:tailEnd type="none" w="med" len="med"/>
+                    </a:lnR>
+                    <a:lnT w="12700" cap="flat" cmpd="sng" algn="ctr">
+                      <a:noFill/>
+                      <a:prstDash val="solid"/>
+                      <a:round/>
+                      <a:headEnd type="none" w="med" len="med"/>
+                      <a:tailEnd type="none" w="med" len="med"/>
+                    </a:lnT>
+                    <a:lnB w="12700" cap="flat" cmpd="sng" algn="ctr">
+                      <a:noFill/>
+                      <a:prstDash val="solid"/>
+                      <a:round/>
+                      <a:headEnd type="none" w="med" len="med"/>
+                      <a:tailEnd type="none" w="med" len="med"/>
+                    </a:lnB>
+                    <a:lnTlToBr w="12700" cmpd="sng">
+                      <a:noFill/>
+                      <a:prstDash val="solid"/>
+                    </a:lnTlToBr>
+                    <a:lnBlToTr w="12700" cmpd="sng">
+                      <a:noFill/>
+                      <a:prstDash val="solid"/>
+                    </a:lnBlToTr>
+                    <a:noFill/>
+                  </a:tcPr>
+                </a:tc>
+                <a:tc>
+                  <a:txBody>
+                    <a:bodyPr/>
+                    <a:lstStyle/>
+                    <a:p>
+                      <a:r>
+                        <a:rPr lang="ru-RU" sz="1800" b="0" kern="1200" dirty="0">
+                          <a:solidFill>
+                            <a:schemeClr val="bg1">
+                              <a:lumMod val="50000"/>
+                            </a:schemeClr>
+                          </a:solidFill>
+                          <a:effectLst/>
+                          <a:latin typeface="+mn-lt"/>
+                          <a:ea typeface="+mn-ea"/>
+                          <a:cs typeface="+mn-cs"/>
+                        </a:rPr>
+                        <a:t>2900 ₽/мес.</a:t>
+                      </a:r>
+                      <a:endParaRPr lang="ru-RU" b="0" dirty="0">
+                        <a:solidFill>
+                          <a:schemeClr val="bg1">
+                            <a:lumMod val="50000"/>
+                          </a:schemeClr>
+                        </a:solidFill>
+                      </a:endParaRPr>
+                    </a:p>
+                  </a:txBody>
+                  <a:tcPr>
+                    <a:lnL w="12700" cap="flat" cmpd="sng" algn="ctr">
+                      <a:noFill/>
+                      <a:prstDash val="solid"/>
+                      <a:round/>
+                      <a:headEnd type="none" w="med" len="med"/>
+                      <a:tailEnd type="none" w="med" len="med"/>
+                    </a:lnL>
+                    <a:lnR w="12700" cap="flat" cmpd="sng" algn="ctr">
+                      <a:noFill/>
+                      <a:prstDash val="solid"/>
+                      <a:round/>
+                      <a:headEnd type="none" w="med" len="med"/>
+                      <a:tailEnd type="none" w="med" len="med"/>
+                    </a:lnR>
+                    <a:lnT w="12700" cap="flat" cmpd="sng" algn="ctr">
+                      <a:noFill/>
+                      <a:prstDash val="solid"/>
+                      <a:round/>
+                      <a:headEnd type="none" w="med" len="med"/>
+                      <a:tailEnd type="none" w="med" len="med"/>
+                    </a:lnT>
+                    <a:lnB w="12700" cap="flat" cmpd="sng" algn="ctr">
+                      <a:noFill/>
+                      <a:prstDash val="solid"/>
+                      <a:round/>
+                      <a:headEnd type="none" w="med" len="med"/>
+                      <a:tailEnd type="none" w="med" len="med"/>
+                    </a:lnB>
+                    <a:lnTlToBr w="12700" cmpd="sng">
+                      <a:noFill/>
+                      <a:prstDash val="solid"/>
+                    </a:lnTlToBr>
+                    <a:lnBlToTr w="12700" cmpd="sng">
+                      <a:noFill/>
+                      <a:prstDash val="solid"/>
+                    </a:lnBlToTr>
+                    <a:noFill/>
+                  </a:tcPr>
+                </a:tc>
+                <a:tc vMerge="1">
+                  <a:txBody>
+                    <a:bodyPr/>
+                    <a:lstStyle/>
+                    <a:p>
+                      <a:endParaRPr lang="ru-RU" dirty="0"/>
+                    </a:p>
+                  </a:txBody>
+                  <a:tcPr/>
+                </a:tc>
+                <a:extLst>
+                  <a:ext uri="{0D108BD9-81ED-4DB2-BD59-A6C34878D82A}">
+                    <a16:rowId xmlns:a16="http://schemas.microsoft.com/office/drawing/2014/main" val="2360030629"/>
+                  </a:ext>
+                </a:extLst>
+              </a:tr>
+            </a:tbl>
+          </a:graphicData>
+        </a:graphic>
+      </p:graphicFrame>
       <p:sp>
         <p:nvSpPr>
           <p:cNvPr id="4" name="Номер слайда 3">
@@ -8955,7 +9426,7 @@
     </p:spTree>
     <p:extLst>
       <p:ext uri="{BB962C8B-B14F-4D97-AF65-F5344CB8AC3E}">
-        <p14:creationId xmlns:p14="http://schemas.microsoft.com/office/powerpoint/2010/main" val="4277416367"/>
+        <p14:creationId xmlns:p14="http://schemas.microsoft.com/office/powerpoint/2010/main" val="571338784"/>
       </p:ext>
     </p:extLst>
   </p:cSld>
@@ -9317,7 +9788,7 @@
           <a:p>
             <a:r>
               <a:rPr lang="ru-RU" dirty="0"/>
-              <a:t>Бизнес модель</a:t>
+              <a:t>Бизнес-модель</a:t>
             </a:r>
           </a:p>
         </p:txBody>
@@ -9356,7 +9827,7 @@
           <a:p>
             <a:r>
               <a:rPr lang="ru-RU" sz="2500" dirty="0"/>
-              <a:t>2000 рублей в месяц</a:t>
+              <a:t>750 рублей в месяц</a:t>
             </a:r>
           </a:p>
           <a:p>

</xml_diff>

<commit_message>
fix: rewrote team role
</commit_message>
<xml_diff>
--- a/presentation/Restobook.pptx
+++ b/presentation/Restobook.pptx
@@ -8042,6 +8042,14 @@
             <a:r>
               <a:rPr lang="en-US" sz="2400" dirty="0" err="1"/>
               <a:t>fullstack</a:t>
+            </a:r>
+            <a:r>
+              <a:rPr lang="en-US" sz="2400" dirty="0"/>
+              <a:t> </a:t>
+            </a:r>
+            <a:r>
+              <a:rPr lang="ru-RU" sz="2400" dirty="0"/>
+              <a:t>разработчик</a:t>
             </a:r>
             <a:endParaRPr lang="en-US" sz="2400" dirty="0"/>
           </a:p>

</xml_diff>

<commit_message>
fix: update main slide
</commit_message>
<xml_diff>
--- a/presentation/Restobook.pptx
+++ b/presentation/Restobook.pptx
@@ -7494,68 +7494,14 @@
         </p:blipFill>
         <p:spPr>
           <a:xfrm>
-            <a:off x="4711286" y="1905419"/>
-            <a:ext cx="2769429" cy="3047163"/>
+            <a:off x="5331441" y="1262224"/>
+            <a:ext cx="1605318" cy="1766308"/>
           </a:xfrm>
           <a:prstGeom prst="rect">
             <a:avLst/>
           </a:prstGeom>
         </p:spPr>
       </p:pic>
-      <p:sp>
-        <p:nvSpPr>
-          <p:cNvPr id="11" name="Прямоугольник 10">
-            <a:extLst>
-              <a:ext uri="{FF2B5EF4-FFF2-40B4-BE49-F238E27FC236}">
-                <a16:creationId xmlns:a16="http://schemas.microsoft.com/office/drawing/2014/main" id="{9563B228-67A2-736C-5D9B-73C7AC51AB80}"/>
-              </a:ext>
-            </a:extLst>
-          </p:cNvPr>
-          <p:cNvSpPr/>
-          <p:nvPr/>
-        </p:nvSpPr>
-        <p:spPr>
-          <a:xfrm>
-            <a:off x="4662583" y="1865078"/>
-            <a:ext cx="3046920" cy="3191016"/>
-          </a:xfrm>
-          <a:prstGeom prst="rect">
-            <a:avLst/>
-          </a:prstGeom>
-          <a:solidFill>
-            <a:schemeClr val="bg2">
-              <a:alpha val="36000"/>
-            </a:schemeClr>
-          </a:solidFill>
-          <a:ln>
-            <a:noFill/>
-          </a:ln>
-        </p:spPr>
-        <p:style>
-          <a:lnRef idx="2">
-            <a:schemeClr val="accent1">
-              <a:shade val="15000"/>
-            </a:schemeClr>
-          </a:lnRef>
-          <a:fillRef idx="1">
-            <a:schemeClr val="accent1"/>
-          </a:fillRef>
-          <a:effectRef idx="0">
-            <a:schemeClr val="accent1"/>
-          </a:effectRef>
-          <a:fontRef idx="minor">
-            <a:schemeClr val="lt1"/>
-          </a:fontRef>
-        </p:style>
-        <p:txBody>
-          <a:bodyPr rtlCol="0" anchor="ctr"/>
-          <a:lstStyle/>
-          <a:p>
-            <a:pPr algn="ctr"/>
-            <a:endParaRPr lang="ru-RU"/>
-          </a:p>
-        </p:txBody>
-      </p:sp>
       <p:sp>
         <p:nvSpPr>
           <p:cNvPr id="2" name="Заголовок 1">
@@ -7574,7 +7520,7 @@
         </p:nvSpPr>
         <p:spPr>
           <a:xfrm>
-            <a:off x="1078523" y="1098388"/>
+            <a:off x="1080000" y="1584163"/>
             <a:ext cx="10318418" cy="4394988"/>
           </a:xfrm>
         </p:spPr>
@@ -7675,8 +7621,8 @@
         </p:nvSpPr>
         <p:spPr>
           <a:xfrm>
-            <a:off x="2577916" y="3671726"/>
-            <a:ext cx="7319632" cy="523220"/>
+            <a:off x="3006853" y="4157501"/>
+            <a:ext cx="6178294" cy="523220"/>
           </a:xfrm>
           <a:prstGeom prst="rect">
             <a:avLst/>
@@ -7695,7 +7641,7 @@
                   <a:schemeClr val="tx2"/>
                 </a:solidFill>
               </a:rPr>
-              <a:t>Освободим время от поиска столов!</a:t>
+              <a:t>Освободим время от учёта столов!</a:t>
             </a:r>
           </a:p>
         </p:txBody>
@@ -8279,7 +8225,7 @@
           <a:p>
             <a:r>
               <a:rPr lang="ru-RU" sz="2500" dirty="0"/>
-              <a:t>Трудности при отслеживании броней и</a:t>
+              <a:t>Трудности при отслеживании броней</a:t>
             </a:r>
           </a:p>
           <a:p>
@@ -8404,7 +8350,9 @@
             </a:r>
           </a:p>
           <a:p>
-            <a:pPr lvl="1"/>
+            <a:pPr marL="457200" lvl="1" indent="0">
+              <a:buNone/>
+            </a:pPr>
             <a:r>
               <a:rPr lang="ru-RU" sz="2500" dirty="0"/>
               <a:t>Владельцы малых и средних заведений</a:t>
@@ -8417,7 +8365,9 @@
             </a:r>
           </a:p>
           <a:p>
-            <a:pPr lvl="1"/>
+            <a:pPr marL="457200" lvl="1" indent="0">
+              <a:buNone/>
+            </a:pPr>
             <a:r>
               <a:rPr lang="ru-RU" sz="2500" dirty="0"/>
               <a:t>Сотрудники заведений</a:t>
@@ -8574,13 +8524,13 @@
           <a:p>
             <a:r>
               <a:rPr lang="ru-RU" sz="2500" dirty="0"/>
-              <a:t>управлять столами</a:t>
+              <a:t>управлять столами и</a:t>
             </a:r>
           </a:p>
           <a:p>
             <a:r>
               <a:rPr lang="ru-RU" sz="2500" dirty="0"/>
-              <a:t>и сотрудниками в зале</a:t>
+              <a:t>сотрудниками в зале</a:t>
             </a:r>
           </a:p>
           <a:p>

</xml_diff>